<commit_message>
Update slides for JOIN
</commit_message>
<xml_diff>
--- a/Courses/Software-Sciences/Module-3-Databases-New/09-Joining-Tables/09-Joining-Tables.pptx
+++ b/Courses/Software-Sciences/Module-3-Databases-New/09-Joining-Tables/09-Joining-Tables.pptx
@@ -531,7 +531,7 @@
           <a:p>
             <a:fld id="{4E087215-0C8F-4762-A664-737A353EC9A4}" type="datetimeFigureOut">
               <a:rPr lang="bg-BG" smtClean="0"/>
-              <a:t>6.10.2023 г.</a:t>
+              <a:t>13.4.2024 г.</a:t>
             </a:fld>
             <a:endParaRPr lang="bg-BG"/>
           </a:p>
@@ -727,7 +727,7 @@
           <a:p>
             <a:fld id="{72D84649-876A-46C9-8472-14CB09C070D8}" type="datetimeFigureOut">
               <a:rPr lang="en-US" smtClean="0"/>
-              <a:t>10/6/2023</a:t>
+              <a:t>4/13/2024</a:t>
             </a:fld>
             <a:endParaRPr lang="en-US"/>
           </a:p>
@@ -14004,9 +14004,21 @@
                   <a:srgbClr val="224464"/>
                 </a:solidFill>
               </a:rPr>
-              <a:t>редове от лявата таблица</a:t>
-            </a:r>
-            <a:endParaRPr lang="en-US" sz="3600" dirty="0"/>
+              <a:t>редове от </a:t>
+            </a:r>
+            <a:r>
+              <a:rPr lang="ru-RU" sz="3600" b="1" dirty="0">
+                <a:solidFill>
+                  <a:schemeClr val="bg1"/>
+                </a:solidFill>
+              </a:rPr>
+              <a:t>лявата таблица</a:t>
+            </a:r>
+            <a:endParaRPr lang="en-US" sz="3600" b="1" dirty="0">
+              <a:solidFill>
+                <a:schemeClr val="bg1"/>
+              </a:solidFill>
+            </a:endParaRPr>
           </a:p>
           <a:p>
             <a:pPr marL="360363" lvl="1"/>
@@ -26469,13 +26481,6 @@
               <a:rPr lang="en-US" dirty="0"/>
               <a:t> JOIN</a:t>
             </a:r>
-          </a:p>
-          <a:p>
-            <a:pPr lvl="1"/>
-            <a:endParaRPr lang="bg-BG" sz="3200" dirty="0"/>
-          </a:p>
-          <a:p>
-            <a:endParaRPr lang="bg-BG" sz="3400" dirty="0"/>
           </a:p>
         </p:txBody>
       </p:sp>

</xml_diff>